<commit_message>
For Bug 36035 70425 Provide proper teplate
</commit_message>
<xml_diff>
--- a/new/ru-RU/new.pptx
+++ b/new/ru-RU/new.pptx
@@ -14,7 +14,7 @@
   <p:notesSz cx="6858000" cy="9144000"/>
   <p:defaultTextStyle>
     <a:defPPr>
-      <a:defRPr lang="fr-FR"/>
+      <a:defRPr lang="ru-RU"/>
     </a:defPPr>
     <a:lvl1pPr marL="0" algn="l" defTabSz="914400" rtl="0" eaLnBrk="1" latinLnBrk="0" hangingPunct="1">
       <a:defRPr sz="1800" kern="1200">
@@ -142,7 +142,7 @@
       </p:grpSpPr>
       <p:sp>
         <p:nvSpPr>
-          <p:cNvPr id="2" name="Espace réservé d'en-tête 1"/>
+          <p:cNvPr id="2" name="Верхний колонтитул 1"/>
           <p:cNvSpPr>
             <a:spLocks noGrp="1"/>
           </p:cNvSpPr>
@@ -167,13 +167,13 @@
             </a:lvl1pPr>
           </a:lstStyle>
           <a:p>
-            <a:endParaRPr lang="fr-FR"/>
-          </a:p>
-        </p:txBody>
-      </p:sp>
-      <p:sp>
-        <p:nvSpPr>
-          <p:cNvPr id="3" name="Espace réservé pour la date 2"/>
+            <a:endParaRPr lang="ru-RU"/>
+          </a:p>
+        </p:txBody>
+      </p:sp>
+      <p:sp>
+        <p:nvSpPr>
+          <p:cNvPr id="3" name="Дата 2"/>
           <p:cNvSpPr>
             <a:spLocks noGrp="1"/>
           </p:cNvSpPr>
@@ -199,16 +199,16 @@
           </a:lstStyle>
           <a:p>
             <a:fld id="{3632E96E-41F7-40C5-8419-297958CC00FA}" type="datetimeFigureOut">
-              <a:rPr lang="fr-FR" smtClean="0"/>
+              <a:rPr lang="ru-RU" smtClean="0"/>
               <a:t>10/30/2013</a:t>
             </a:fld>
-            <a:endParaRPr lang="fr-FR"/>
-          </a:p>
-        </p:txBody>
-      </p:sp>
-      <p:sp>
-        <p:nvSpPr>
-          <p:cNvPr id="4" name="Espace réservé pour l'image de la diapositive 3"/>
+            <a:endParaRPr lang="ru-RU"/>
+          </a:p>
+        </p:txBody>
+      </p:sp>
+      <p:sp>
+        <p:nvSpPr>
+          <p:cNvPr id="4" name="Рисунок 3"/>
           <p:cNvSpPr>
             <a:spLocks noGrp="1" noRot="1" noChangeAspect="1"/>
           </p:cNvSpPr>
@@ -235,13 +235,13 @@
           <a:bodyPr vert="horz" lIns="91440" tIns="45720" rIns="91440" bIns="45720" rtlCol="0" anchor="ctr"/>
           <a:lstStyle/>
           <a:p>
-            <a:endParaRPr lang="fr-FR"/>
-          </a:p>
-        </p:txBody>
-      </p:sp>
-      <p:sp>
-        <p:nvSpPr>
-          <p:cNvPr id="5" name="Remarques Espace réservé 4"/>
+            <a:endParaRPr lang="ru-RU"/>
+          </a:p>
+        </p:txBody>
+      </p:sp>
+      <p:sp>
+        <p:nvSpPr>
+          <p:cNvPr id="5" name="Заметка 4"/>
           <p:cNvSpPr>
             <a:spLocks noGrp="1"/>
           </p:cNvSpPr>
@@ -264,44 +264,44 @@
           <a:p>
             <a:pPr lvl="0"/>
             <a:r>
-              <a:rPr lang="fr-FR" smtClean="0"/>
-              <a:t>Modifiez les styles du texte du masque</a:t>
+              <a:rPr lang="ru-RU" smtClean="0"/>
+              <a:t>Образец текста</a:t>
             </a:r>
           </a:p>
           <a:p>
             <a:pPr lvl="1"/>
             <a:r>
-              <a:rPr lang="fr-FR" smtClean="0"/>
-              <a:t>Deuxième niveau</a:t>
+              <a:rPr lang="ru-RU" smtClean="0"/>
+              <a:t>Второй уровень</a:t>
             </a:r>
           </a:p>
           <a:p>
             <a:pPr lvl="2"/>
             <a:r>
-              <a:rPr lang="fr-FR" smtClean="0"/>
-              <a:t>Troisième niveau</a:t>
+              <a:rPr lang="ru-RU" smtClean="0"/>
+              <a:t>Третий уровень</a:t>
             </a:r>
           </a:p>
           <a:p>
             <a:pPr lvl="3"/>
             <a:r>
-              <a:rPr lang="fr-FR" smtClean="0"/>
-              <a:t>Quatrième niveau</a:t>
+              <a:rPr lang="ru-RU" smtClean="0"/>
+              <a:t>Четвертый уровень</a:t>
             </a:r>
           </a:p>
           <a:p>
             <a:pPr lvl="4"/>
             <a:r>
-              <a:rPr lang="fr-FR" smtClean="0"/>
-              <a:t>Cinquième niveau</a:t>
-            </a:r>
-            <a:endParaRPr lang="fr-FR"/>
-          </a:p>
-        </p:txBody>
-      </p:sp>
-      <p:sp>
-        <p:nvSpPr>
-          <p:cNvPr id="6" name="Espace réservé du pied de page 5"/>
+              <a:rPr lang="ru-RU" smtClean="0"/>
+              <a:t>Пятый уровень</a:t>
+            </a:r>
+            <a:endParaRPr lang="ru-RU"/>
+          </a:p>
+        </p:txBody>
+      </p:sp>
+      <p:sp>
+        <p:nvSpPr>
+          <p:cNvPr id="6" name="Нижний колонтитул 5"/>
           <p:cNvSpPr>
             <a:spLocks noGrp="1"/>
           </p:cNvSpPr>
@@ -326,13 +326,13 @@
             </a:lvl1pPr>
           </a:lstStyle>
           <a:p>
-            <a:endParaRPr lang="fr-FR"/>
-          </a:p>
-        </p:txBody>
-      </p:sp>
-      <p:sp>
-        <p:nvSpPr>
-          <p:cNvPr id="7" name="Espace réservé du numéro de diapositive 6"/>
+            <a:endParaRPr lang="ru-RU"/>
+          </a:p>
+        </p:txBody>
+      </p:sp>
+      <p:sp>
+        <p:nvSpPr>
+          <p:cNvPr id="7" name="Номер слайда 6"/>
           <p:cNvSpPr>
             <a:spLocks noGrp="1"/>
           </p:cNvSpPr>
@@ -358,10 +358,10 @@
           </a:lstStyle>
           <a:p>
             <a:fld id="{2E6999B8-B6B4-4561-A3CD-BBCDAB9FC9D9}" type="slidenum">
-              <a:rPr lang="fr-FR" smtClean="0"/>
+              <a:rPr lang="ru-RU" smtClean="0"/>
               <a:t>‹#›</a:t>
             </a:fld>
-            <a:endParaRPr lang="fr-FR"/>
+            <a:endParaRPr lang="ru-RU"/>
           </a:p>
         </p:txBody>
       </p:sp>
@@ -487,7 +487,7 @@
       </p:grpSpPr>
       <p:sp>
         <p:nvSpPr>
-          <p:cNvPr id="2" name="Espace réservé pour l'image de la diapositive 1"/>
+          <p:cNvPr id="2" name="Рисунок 1"/>
           <p:cNvSpPr>
             <a:spLocks noGrp="1" noRot="1" noChangeAspect="1"/>
           </p:cNvSpPr>
@@ -504,7 +504,7 @@
       </p:sp>
       <p:sp>
         <p:nvSpPr>
-          <p:cNvPr id="3" name="Remarques Espace réservé 2"/>
+          <p:cNvPr id="3" name="Текст 2"/>
           <p:cNvSpPr>
             <a:spLocks noGrp="1"/>
           </p:cNvSpPr>
@@ -517,7 +517,7 @@
           <a:bodyPr/>
           <a:lstStyle/>
           <a:p>
-            <a:endParaRPr lang="fr-FR" dirty="0">
+            <a:endParaRPr lang="ru-RU" dirty="0">
               <a:latin typeface="Arial" panose="020B0604020202020204" pitchFamily="34" charset="0"/>
               <a:cs typeface="Arial" panose="020B0604020202020204" pitchFamily="34" charset="0"/>
             </a:endParaRPr>
@@ -526,7 +526,7 @@
       </p:sp>
       <p:sp>
         <p:nvSpPr>
-          <p:cNvPr id="4" name="Espace réservé pour le numéro de diapositive 3"/>
+          <p:cNvPr id="4" name="Номер слайда 3"/>
           <p:cNvSpPr>
             <a:spLocks noGrp="1"/>
           </p:cNvSpPr>
@@ -540,10 +540,10 @@
           <a:lstStyle/>
           <a:p>
             <a:fld id="{2E6999B8-B6B4-4561-A3CD-BBCDAB9FC9D9}" type="slidenum">
-              <a:rPr lang="fr-FR" smtClean="0"/>
+              <a:rPr lang="ru-RU" smtClean="0"/>
               <a:t>1</a:t>
             </a:fld>
-            <a:endParaRPr lang="fr-FR"/>
+            <a:endParaRPr lang="ru-RU"/>
           </a:p>
         </p:txBody>
       </p:sp>
@@ -562,7 +562,7 @@
 
 <file path=ppt/slideLayouts/slideLayout1.xml><?xml version="1.0" encoding="utf-8"?>
 <p:sldLayout xmlns:a="http://schemas.openxmlformats.org/drawingml/2006/main" xmlns:r="http://schemas.openxmlformats.org/officeDocument/2006/relationships" xmlns:p="http://schemas.openxmlformats.org/presentationml/2006/main" type="title" preserve="1">
-  <p:cSld name="Diapositive de titre">
+  <p:cSld name="Титульный слайд">
     <p:spTree>
       <p:nvGrpSpPr>
         <p:cNvPr id="1" name=""/>
@@ -579,7 +579,7 @@
       </p:grpSpPr>
       <p:sp>
         <p:nvSpPr>
-          <p:cNvPr id="2" name="Titre 1"/>
+          <p:cNvPr id="2" name="Заголовок 1"/>
           <p:cNvSpPr>
             <a:spLocks noGrp="1"/>
           </p:cNvSpPr>
@@ -602,16 +602,16 @@
           </a:lstStyle>
           <a:p>
             <a:r>
-              <a:rPr lang="fr-FR" smtClean="0"/>
-              <a:t>Modifiez le style du titre</a:t>
-            </a:r>
-            <a:endParaRPr lang="fr-FR" dirty="0"/>
-          </a:p>
-        </p:txBody>
-      </p:sp>
-      <p:sp>
-        <p:nvSpPr>
-          <p:cNvPr id="3" name="Sous-titre 2"/>
+              <a:rPr lang="ru-RU" smtClean="0"/>
+              <a:t>Образец заголовка</a:t>
+            </a:r>
+            <a:endParaRPr lang="ru-RU" dirty="0"/>
+          </a:p>
+        </p:txBody>
+      </p:sp>
+      <p:sp>
+        <p:nvSpPr>
+          <p:cNvPr id="3" name="Подзаголовок 2"/>
           <p:cNvSpPr>
             <a:spLocks noGrp="1"/>
           </p:cNvSpPr>
@@ -667,16 +667,16 @@
           </a:lstStyle>
           <a:p>
             <a:r>
-              <a:rPr lang="fr-FR" smtClean="0"/>
-              <a:t>Modifiez le style des sous-titres du masque</a:t>
-            </a:r>
-            <a:endParaRPr lang="fr-FR" dirty="0"/>
-          </a:p>
-        </p:txBody>
-      </p:sp>
-      <p:sp>
-        <p:nvSpPr>
-          <p:cNvPr id="4" name="Espace réservé de la date 3"/>
+              <a:rPr lang="ru-RU" smtClean="0"/>
+              <a:t>Образец подзаголовка</a:t>
+            </a:r>
+            <a:endParaRPr lang="ru-RU" dirty="0"/>
+          </a:p>
+        </p:txBody>
+      </p:sp>
+      <p:sp>
+        <p:nvSpPr>
+          <p:cNvPr id="4" name="Дата 3"/>
           <p:cNvSpPr>
             <a:spLocks noGrp="1"/>
           </p:cNvSpPr>
@@ -690,16 +690,16 @@
           <a:lstStyle/>
           <a:p>
             <a:fld id="{BCC18F51-09EC-435C-A3BA-64A766E099C0}" type="datetimeFigureOut">
-              <a:rPr lang="fr-FR" smtClean="0"/>
+              <a:rPr lang="ru-RU" smtClean="0"/>
               <a:t>30.10.2013</a:t>
             </a:fld>
-            <a:endParaRPr lang="fr-FR"/>
-          </a:p>
-        </p:txBody>
-      </p:sp>
-      <p:sp>
-        <p:nvSpPr>
-          <p:cNvPr id="5" name="Espace réservé du pied de page 4"/>
+            <a:endParaRPr lang="ru-RU"/>
+          </a:p>
+        </p:txBody>
+      </p:sp>
+      <p:sp>
+        <p:nvSpPr>
+          <p:cNvPr id="5" name="Нижний колонтитул 4"/>
           <p:cNvSpPr>
             <a:spLocks noGrp="1"/>
           </p:cNvSpPr>
@@ -712,13 +712,13 @@
           <a:bodyPr/>
           <a:lstStyle/>
           <a:p>
-            <a:endParaRPr lang="fr-FR"/>
-          </a:p>
-        </p:txBody>
-      </p:sp>
-      <p:sp>
-        <p:nvSpPr>
-          <p:cNvPr id="6" name="Espace réservé du numéro de diapositive 5"/>
+            <a:endParaRPr lang="ru-RU"/>
+          </a:p>
+        </p:txBody>
+      </p:sp>
+      <p:sp>
+        <p:nvSpPr>
+          <p:cNvPr id="6" name="Номер слайда 5"/>
           <p:cNvSpPr>
             <a:spLocks noGrp="1"/>
           </p:cNvSpPr>
@@ -732,10 +732,10 @@
           <a:lstStyle/>
           <a:p>
             <a:fld id="{08395586-F03A-48D1-94DF-16B239DF4FB5}" type="slidenum">
-              <a:rPr lang="fr-FR" smtClean="0"/>
+              <a:rPr lang="ru-RU" smtClean="0"/>
               <a:t>‹#›</a:t>
             </a:fld>
-            <a:endParaRPr lang="fr-FR"/>
+            <a:endParaRPr lang="ru-RU"/>
           </a:p>
         </p:txBody>
       </p:sp>
@@ -754,7 +754,7 @@
 
 <file path=ppt/slideLayouts/slideLayout10.xml><?xml version="1.0" encoding="utf-8"?>
 <p:sldLayout xmlns:a="http://schemas.openxmlformats.org/drawingml/2006/main" xmlns:r="http://schemas.openxmlformats.org/officeDocument/2006/relationships" xmlns:p="http://schemas.openxmlformats.org/presentationml/2006/main" type="vertTx" preserve="1">
-  <p:cSld name="Titre et texte vertical">
+  <p:cSld name="Заголовок и вертикальный текст">
     <p:spTree>
       <p:nvGrpSpPr>
         <p:cNvPr id="1" name=""/>
@@ -771,7 +771,7 @@
       </p:grpSpPr>
       <p:sp>
         <p:nvSpPr>
-          <p:cNvPr id="2" name="Titre 1"/>
+          <p:cNvPr id="2" name="Заголовок 1"/>
           <p:cNvSpPr>
             <a:spLocks noGrp="1"/>
           </p:cNvSpPr>
@@ -785,16 +785,16 @@
           <a:lstStyle/>
           <a:p>
             <a:r>
-              <a:rPr lang="fr-FR" smtClean="0"/>
-              <a:t>Modifiez le style du titre</a:t>
-            </a:r>
-            <a:endParaRPr lang="fr-FR" dirty="0"/>
-          </a:p>
-        </p:txBody>
-      </p:sp>
-      <p:sp>
-        <p:nvSpPr>
-          <p:cNvPr id="3" name="Espace réservé du texte vertical 2"/>
+              <a:rPr lang="ru-RU" smtClean="0"/>
+              <a:t>Образец заголовка</a:t>
+            </a:r>
+            <a:endParaRPr lang="ru-RU" dirty="0"/>
+          </a:p>
+        </p:txBody>
+      </p:sp>
+      <p:sp>
+        <p:nvSpPr>
+          <p:cNvPr id="3" name="Вертикальный текст 2"/>
           <p:cNvSpPr>
             <a:spLocks noGrp="1"/>
           </p:cNvSpPr>
@@ -809,44 +809,44 @@
           <a:p>
             <a:pPr lvl="0"/>
             <a:r>
-              <a:rPr lang="fr-FR" smtClean="0"/>
-              <a:t>Modifiez les styles du texte du masque</a:t>
+              <a:rPr lang="ru-RU" smtClean="0"/>
+              <a:t>Образец текста</a:t>
             </a:r>
           </a:p>
           <a:p>
             <a:pPr lvl="1"/>
             <a:r>
-              <a:rPr lang="fr-FR" smtClean="0"/>
-              <a:t>Deuxième niveau</a:t>
+              <a:rPr lang="ru-RU" smtClean="0"/>
+              <a:t>Второй уровень</a:t>
             </a:r>
           </a:p>
           <a:p>
             <a:pPr lvl="2"/>
             <a:r>
-              <a:rPr lang="fr-FR" smtClean="0"/>
-              <a:t>Troisième niveau</a:t>
+              <a:rPr lang="ru-RU" smtClean="0"/>
+              <a:t>Третий уровень</a:t>
             </a:r>
           </a:p>
           <a:p>
             <a:pPr lvl="3"/>
             <a:r>
-              <a:rPr lang="fr-FR" smtClean="0"/>
-              <a:t>Quatrième niveau</a:t>
+              <a:rPr lang="ru-RU" smtClean="0"/>
+              <a:t>Четвертый уровень</a:t>
             </a:r>
           </a:p>
           <a:p>
             <a:pPr lvl="4"/>
             <a:r>
-              <a:rPr lang="fr-FR" smtClean="0"/>
-              <a:t>Cinquième niveau</a:t>
-            </a:r>
-            <a:endParaRPr lang="fr-FR" dirty="0"/>
-          </a:p>
-        </p:txBody>
-      </p:sp>
-      <p:sp>
-        <p:nvSpPr>
-          <p:cNvPr id="4" name="Espace réservé de la date 3"/>
+              <a:rPr lang="ru-RU" smtClean="0"/>
+              <a:t>Пятый уровень</a:t>
+            </a:r>
+            <a:endParaRPr lang="ru-RU" dirty="0"/>
+          </a:p>
+        </p:txBody>
+      </p:sp>
+      <p:sp>
+        <p:nvSpPr>
+          <p:cNvPr id="4" name="Дата 3"/>
           <p:cNvSpPr>
             <a:spLocks noGrp="1"/>
           </p:cNvSpPr>
@@ -860,16 +860,16 @@
           <a:lstStyle/>
           <a:p>
             <a:fld id="{BCC18F51-09EC-435C-A3BA-64A766E099C0}" type="datetimeFigureOut">
-              <a:rPr lang="fr-FR" smtClean="0"/>
+              <a:rPr lang="ru-RU" smtClean="0"/>
               <a:t>30.10.2013</a:t>
             </a:fld>
-            <a:endParaRPr lang="fr-FR"/>
-          </a:p>
-        </p:txBody>
-      </p:sp>
-      <p:sp>
-        <p:nvSpPr>
-          <p:cNvPr id="5" name="Espace réservé du pied de page 4"/>
+            <a:endParaRPr lang="ru-RU"/>
+          </a:p>
+        </p:txBody>
+      </p:sp>
+      <p:sp>
+        <p:nvSpPr>
+          <p:cNvPr id="5" name="Нижний колонтитул 4"/>
           <p:cNvSpPr>
             <a:spLocks noGrp="1"/>
           </p:cNvSpPr>
@@ -882,13 +882,13 @@
           <a:bodyPr/>
           <a:lstStyle/>
           <a:p>
-            <a:endParaRPr lang="fr-FR"/>
-          </a:p>
-        </p:txBody>
-      </p:sp>
-      <p:sp>
-        <p:nvSpPr>
-          <p:cNvPr id="6" name="Espace réservé du numéro de diapositive 5"/>
+            <a:endParaRPr lang="ru-RU"/>
+          </a:p>
+        </p:txBody>
+      </p:sp>
+      <p:sp>
+        <p:nvSpPr>
+          <p:cNvPr id="6" name="Номер слайда 5"/>
           <p:cNvSpPr>
             <a:spLocks noGrp="1"/>
           </p:cNvSpPr>
@@ -902,10 +902,10 @@
           <a:lstStyle/>
           <a:p>
             <a:fld id="{08395586-F03A-48D1-94DF-16B239DF4FB5}" type="slidenum">
-              <a:rPr lang="fr-FR" smtClean="0"/>
+              <a:rPr lang="ru-RU" smtClean="0"/>
               <a:t>‹#›</a:t>
             </a:fld>
-            <a:endParaRPr lang="fr-FR"/>
+            <a:endParaRPr lang="ru-RU"/>
           </a:p>
         </p:txBody>
       </p:sp>
@@ -924,7 +924,7 @@
 
 <file path=ppt/slideLayouts/slideLayout11.xml><?xml version="1.0" encoding="utf-8"?>
 <p:sldLayout xmlns:a="http://schemas.openxmlformats.org/drawingml/2006/main" xmlns:r="http://schemas.openxmlformats.org/officeDocument/2006/relationships" xmlns:p="http://schemas.openxmlformats.org/presentationml/2006/main" type="vertTitleAndTx" preserve="1">
-  <p:cSld name="Titre vertical et texte">
+  <p:cSld name="Вертикальный заголовок и текст">
     <p:spTree>
       <p:nvGrpSpPr>
         <p:cNvPr id="1" name=""/>
@@ -941,7 +941,7 @@
       </p:grpSpPr>
       <p:sp>
         <p:nvSpPr>
-          <p:cNvPr id="2" name="Titre vertical 1"/>
+          <p:cNvPr id="2" name="Вертикальный заголовок 1"/>
           <p:cNvSpPr>
             <a:spLocks noGrp="1"/>
           </p:cNvSpPr>
@@ -960,16 +960,16 @@
           <a:lstStyle/>
           <a:p>
             <a:r>
-              <a:rPr lang="fr-FR" smtClean="0"/>
-              <a:t>Modifiez le style du titre</a:t>
-            </a:r>
-            <a:endParaRPr lang="fr-FR" dirty="0"/>
-          </a:p>
-        </p:txBody>
-      </p:sp>
-      <p:sp>
-        <p:nvSpPr>
-          <p:cNvPr id="3" name="Espace réservé du texte vertical 2"/>
+              <a:rPr lang="ru-RU" smtClean="0"/>
+              <a:t>Образец заголовка</a:t>
+            </a:r>
+            <a:endParaRPr lang="ru-RU" dirty="0"/>
+          </a:p>
+        </p:txBody>
+      </p:sp>
+      <p:sp>
+        <p:nvSpPr>
+          <p:cNvPr id="3" name="Вертикальный текст 2"/>
           <p:cNvSpPr>
             <a:spLocks noGrp="1"/>
           </p:cNvSpPr>
@@ -989,44 +989,44 @@
           <a:p>
             <a:pPr lvl="0"/>
             <a:r>
-              <a:rPr lang="fr-FR" smtClean="0"/>
-              <a:t>Modifiez les styles du texte du masque</a:t>
+              <a:rPr lang="ru-RU" smtClean="0"/>
+              <a:t>Образец текста</a:t>
             </a:r>
           </a:p>
           <a:p>
             <a:pPr lvl="1"/>
             <a:r>
-              <a:rPr lang="fr-FR" smtClean="0"/>
-              <a:t>Deuxième niveau</a:t>
+              <a:rPr lang="ru-RU" smtClean="0"/>
+              <a:t>Второй уровень</a:t>
             </a:r>
           </a:p>
           <a:p>
             <a:pPr lvl="2"/>
             <a:r>
-              <a:rPr lang="fr-FR" smtClean="0"/>
-              <a:t>Troisième niveau</a:t>
+              <a:rPr lang="ru-RU" smtClean="0"/>
+              <a:t>Третий уровень</a:t>
             </a:r>
           </a:p>
           <a:p>
             <a:pPr lvl="3"/>
             <a:r>
-              <a:rPr lang="fr-FR" smtClean="0"/>
-              <a:t>Quatrième niveau</a:t>
+              <a:rPr lang="ru-RU" smtClean="0"/>
+              <a:t>Четвертый уровень</a:t>
             </a:r>
           </a:p>
           <a:p>
             <a:pPr lvl="4"/>
             <a:r>
-              <a:rPr lang="fr-FR" smtClean="0"/>
-              <a:t>Cinquième niveau</a:t>
-            </a:r>
-            <a:endParaRPr lang="fr-FR" dirty="0"/>
-          </a:p>
-        </p:txBody>
-      </p:sp>
-      <p:sp>
-        <p:nvSpPr>
-          <p:cNvPr id="4" name="Espace réservé de la date 3"/>
+              <a:rPr lang="ru-RU" smtClean="0"/>
+              <a:t>Пятый уровень</a:t>
+            </a:r>
+            <a:endParaRPr lang="ru-RU" dirty="0"/>
+          </a:p>
+        </p:txBody>
+      </p:sp>
+      <p:sp>
+        <p:nvSpPr>
+          <p:cNvPr id="4" name="Дата 3"/>
           <p:cNvSpPr>
             <a:spLocks noGrp="1"/>
           </p:cNvSpPr>
@@ -1040,16 +1040,16 @@
           <a:lstStyle/>
           <a:p>
             <a:fld id="{BCC18F51-09EC-435C-A3BA-64A766E099C0}" type="datetimeFigureOut">
-              <a:rPr lang="fr-FR" smtClean="0"/>
+              <a:rPr lang="ru-RU" smtClean="0"/>
               <a:t>30.10.2013</a:t>
             </a:fld>
-            <a:endParaRPr lang="fr-FR"/>
-          </a:p>
-        </p:txBody>
-      </p:sp>
-      <p:sp>
-        <p:nvSpPr>
-          <p:cNvPr id="5" name="Espace réservé du pied de page 4"/>
+            <a:endParaRPr lang="ru-RU"/>
+          </a:p>
+        </p:txBody>
+      </p:sp>
+      <p:sp>
+        <p:nvSpPr>
+          <p:cNvPr id="5" name="Нижний колонтитул 4"/>
           <p:cNvSpPr>
             <a:spLocks noGrp="1"/>
           </p:cNvSpPr>
@@ -1062,13 +1062,13 @@
           <a:bodyPr/>
           <a:lstStyle/>
           <a:p>
-            <a:endParaRPr lang="fr-FR"/>
-          </a:p>
-        </p:txBody>
-      </p:sp>
-      <p:sp>
-        <p:nvSpPr>
-          <p:cNvPr id="6" name="Espace réservé du numéro de diapositive 5"/>
+            <a:endParaRPr lang="ru-RU"/>
+          </a:p>
+        </p:txBody>
+      </p:sp>
+      <p:sp>
+        <p:nvSpPr>
+          <p:cNvPr id="6" name="Номер слайда 5"/>
           <p:cNvSpPr>
             <a:spLocks noGrp="1"/>
           </p:cNvSpPr>
@@ -1082,10 +1082,10 @@
           <a:lstStyle/>
           <a:p>
             <a:fld id="{08395586-F03A-48D1-94DF-16B239DF4FB5}" type="slidenum">
-              <a:rPr lang="fr-FR" smtClean="0"/>
+              <a:rPr lang="ru-RU" smtClean="0"/>
               <a:t>‹#›</a:t>
             </a:fld>
-            <a:endParaRPr lang="fr-FR"/>
+            <a:endParaRPr lang="ru-RU"/>
           </a:p>
         </p:txBody>
       </p:sp>
@@ -1104,7 +1104,7 @@
 
 <file path=ppt/slideLayouts/slideLayout2.xml><?xml version="1.0" encoding="utf-8"?>
 <p:sldLayout xmlns:a="http://schemas.openxmlformats.org/drawingml/2006/main" xmlns:r="http://schemas.openxmlformats.org/officeDocument/2006/relationships" xmlns:p="http://schemas.openxmlformats.org/presentationml/2006/main" type="obj" preserve="1">
-  <p:cSld name="Titre et contenu">
+  <p:cSld name="Заголовок и объект">
     <p:spTree>
       <p:nvGrpSpPr>
         <p:cNvPr id="1" name=""/>
@@ -1121,7 +1121,7 @@
       </p:grpSpPr>
       <p:sp>
         <p:nvSpPr>
-          <p:cNvPr id="2" name="Titre 1"/>
+          <p:cNvPr id="2" name="Заголовок 1"/>
           <p:cNvSpPr>
             <a:spLocks noGrp="1"/>
           </p:cNvSpPr>
@@ -1135,16 +1135,16 @@
           <a:lstStyle/>
           <a:p>
             <a:r>
-              <a:rPr lang="fr-FR" smtClean="0"/>
-              <a:t>Modifiez le style du titre</a:t>
-            </a:r>
-            <a:endParaRPr lang="fr-FR" dirty="0"/>
-          </a:p>
-        </p:txBody>
-      </p:sp>
-      <p:sp>
-        <p:nvSpPr>
-          <p:cNvPr id="3" name="Espace réservé du contenu 2"/>
+              <a:rPr lang="ru-RU" smtClean="0"/>
+              <a:t>Образец заголовка</a:t>
+            </a:r>
+            <a:endParaRPr lang="ru-RU" dirty="0"/>
+          </a:p>
+        </p:txBody>
+      </p:sp>
+      <p:sp>
+        <p:nvSpPr>
+          <p:cNvPr id="3" name="Объект 2"/>
           <p:cNvSpPr>
             <a:spLocks noGrp="1"/>
           </p:cNvSpPr>
@@ -1159,44 +1159,44 @@
           <a:p>
             <a:pPr lvl="0"/>
             <a:r>
-              <a:rPr lang="fr-FR" smtClean="0"/>
-              <a:t>Modifiez les styles du texte du masque</a:t>
+              <a:rPr lang="ru-RU" smtClean="0"/>
+              <a:t>Образец текста</a:t>
             </a:r>
           </a:p>
           <a:p>
             <a:pPr lvl="1"/>
             <a:r>
-              <a:rPr lang="fr-FR" smtClean="0"/>
-              <a:t>Deuxième niveau</a:t>
+              <a:rPr lang="ru-RU" smtClean="0"/>
+              <a:t>Второй уровень</a:t>
             </a:r>
           </a:p>
           <a:p>
             <a:pPr lvl="2"/>
             <a:r>
-              <a:rPr lang="fr-FR" smtClean="0"/>
-              <a:t>Troisième niveau</a:t>
+              <a:rPr lang="ru-RU" smtClean="0"/>
+              <a:t>Третий уровень</a:t>
             </a:r>
           </a:p>
           <a:p>
             <a:pPr lvl="3"/>
             <a:r>
-              <a:rPr lang="fr-FR" smtClean="0"/>
-              <a:t>Quatrième niveau</a:t>
+              <a:rPr lang="ru-RU" smtClean="0"/>
+              <a:t>Четвертый уровень</a:t>
             </a:r>
           </a:p>
           <a:p>
             <a:pPr lvl="4"/>
             <a:r>
-              <a:rPr lang="fr-FR" smtClean="0"/>
-              <a:t>Cinquième niveau</a:t>
-            </a:r>
-            <a:endParaRPr lang="fr-FR" dirty="0"/>
-          </a:p>
-        </p:txBody>
-      </p:sp>
-      <p:sp>
-        <p:nvSpPr>
-          <p:cNvPr id="4" name="Espace réservé de la date 3"/>
+              <a:rPr lang="ru-RU" smtClean="0"/>
+              <a:t>Пятый уровень</a:t>
+            </a:r>
+            <a:endParaRPr lang="ru-RU" dirty="0"/>
+          </a:p>
+        </p:txBody>
+      </p:sp>
+      <p:sp>
+        <p:nvSpPr>
+          <p:cNvPr id="4" name="Дата 3"/>
           <p:cNvSpPr>
             <a:spLocks noGrp="1"/>
           </p:cNvSpPr>
@@ -1210,16 +1210,16 @@
           <a:lstStyle/>
           <a:p>
             <a:fld id="{BCC18F51-09EC-435C-A3BA-64A766E099C0}" type="datetimeFigureOut">
-              <a:rPr lang="fr-FR" smtClean="0"/>
+              <a:rPr lang="ru-RU" smtClean="0"/>
               <a:t>30.10.2013</a:t>
             </a:fld>
-            <a:endParaRPr lang="fr-FR"/>
-          </a:p>
-        </p:txBody>
-      </p:sp>
-      <p:sp>
-        <p:nvSpPr>
-          <p:cNvPr id="5" name="Espace réservé du pied de page 4"/>
+            <a:endParaRPr lang="ru-RU"/>
+          </a:p>
+        </p:txBody>
+      </p:sp>
+      <p:sp>
+        <p:nvSpPr>
+          <p:cNvPr id="5" name="Нижний колонтитул 4"/>
           <p:cNvSpPr>
             <a:spLocks noGrp="1"/>
           </p:cNvSpPr>
@@ -1232,13 +1232,13 @@
           <a:bodyPr/>
           <a:lstStyle/>
           <a:p>
-            <a:endParaRPr lang="fr-FR"/>
-          </a:p>
-        </p:txBody>
-      </p:sp>
-      <p:sp>
-        <p:nvSpPr>
-          <p:cNvPr id="6" name="Espace réservé du numéro de diapositive 5"/>
+            <a:endParaRPr lang="ru-RU"/>
+          </a:p>
+        </p:txBody>
+      </p:sp>
+      <p:sp>
+        <p:nvSpPr>
+          <p:cNvPr id="6" name="Номер слайда 5"/>
           <p:cNvSpPr>
             <a:spLocks noGrp="1"/>
           </p:cNvSpPr>
@@ -1252,10 +1252,10 @@
           <a:lstStyle/>
           <a:p>
             <a:fld id="{08395586-F03A-48D1-94DF-16B239DF4FB5}" type="slidenum">
-              <a:rPr lang="fr-FR" smtClean="0"/>
+              <a:rPr lang="ru-RU" smtClean="0"/>
               <a:t>‹#›</a:t>
             </a:fld>
-            <a:endParaRPr lang="fr-FR"/>
+            <a:endParaRPr lang="ru-RU"/>
           </a:p>
         </p:txBody>
       </p:sp>
@@ -1274,7 +1274,7 @@
 
 <file path=ppt/slideLayouts/slideLayout3.xml><?xml version="1.0" encoding="utf-8"?>
 <p:sldLayout xmlns:a="http://schemas.openxmlformats.org/drawingml/2006/main" xmlns:r="http://schemas.openxmlformats.org/officeDocument/2006/relationships" xmlns:p="http://schemas.openxmlformats.org/presentationml/2006/main" type="secHead" preserve="1">
-  <p:cSld name="Titre de section">
+  <p:cSld name="Заголовок раздела">
     <p:spTree>
       <p:nvGrpSpPr>
         <p:cNvPr id="1" name=""/>
@@ -1291,7 +1291,7 @@
       </p:grpSpPr>
       <p:sp>
         <p:nvSpPr>
-          <p:cNvPr id="2" name="Titre 1"/>
+          <p:cNvPr id="2" name="Заголовок 1"/>
           <p:cNvSpPr>
             <a:spLocks noGrp="1"/>
           </p:cNvSpPr>
@@ -1314,16 +1314,16 @@
           </a:lstStyle>
           <a:p>
             <a:r>
-              <a:rPr lang="fr-FR" smtClean="0"/>
-              <a:t>Modifiez le style du titre</a:t>
-            </a:r>
-            <a:endParaRPr lang="fr-FR" dirty="0"/>
-          </a:p>
-        </p:txBody>
-      </p:sp>
-      <p:sp>
-        <p:nvSpPr>
-          <p:cNvPr id="3" name="Espace réservé du texte 2"/>
+              <a:rPr lang="ru-RU" smtClean="0"/>
+              <a:t>Образец заголовка</a:t>
+            </a:r>
+            <a:endParaRPr lang="ru-RU" dirty="0"/>
+          </a:p>
+        </p:txBody>
+      </p:sp>
+      <p:sp>
+        <p:nvSpPr>
+          <p:cNvPr id="3" name="Текст 2"/>
           <p:cNvSpPr>
             <a:spLocks noGrp="1"/>
           </p:cNvSpPr>
@@ -1434,15 +1434,15 @@
           <a:p>
             <a:pPr lvl="0"/>
             <a:r>
-              <a:rPr lang="fr-FR" smtClean="0"/>
-              <a:t>Modifiez les styles du texte du masque</a:t>
-            </a:r>
-          </a:p>
-        </p:txBody>
-      </p:sp>
-      <p:sp>
-        <p:nvSpPr>
-          <p:cNvPr id="4" name="Espace réservé de la date 3"/>
+              <a:rPr lang="ru-RU" smtClean="0"/>
+              <a:t>Образец текста</a:t>
+            </a:r>
+          </a:p>
+        </p:txBody>
+      </p:sp>
+      <p:sp>
+        <p:nvSpPr>
+          <p:cNvPr id="4" name="Дата 3"/>
           <p:cNvSpPr>
             <a:spLocks noGrp="1"/>
           </p:cNvSpPr>
@@ -1456,16 +1456,16 @@
           <a:lstStyle/>
           <a:p>
             <a:fld id="{BCC18F51-09EC-435C-A3BA-64A766E099C0}" type="datetimeFigureOut">
-              <a:rPr lang="fr-FR" smtClean="0"/>
+              <a:rPr lang="ru-RU" smtClean="0"/>
               <a:t>30.10.2013</a:t>
             </a:fld>
-            <a:endParaRPr lang="fr-FR"/>
-          </a:p>
-        </p:txBody>
-      </p:sp>
-      <p:sp>
-        <p:nvSpPr>
-          <p:cNvPr id="5" name="Espace réservé du pied de page 4"/>
+            <a:endParaRPr lang="ru-RU"/>
+          </a:p>
+        </p:txBody>
+      </p:sp>
+      <p:sp>
+        <p:nvSpPr>
+          <p:cNvPr id="5" name="Нижний колонтитул 4"/>
           <p:cNvSpPr>
             <a:spLocks noGrp="1"/>
           </p:cNvSpPr>
@@ -1478,13 +1478,13 @@
           <a:bodyPr/>
           <a:lstStyle/>
           <a:p>
-            <a:endParaRPr lang="fr-FR"/>
-          </a:p>
-        </p:txBody>
-      </p:sp>
-      <p:sp>
-        <p:nvSpPr>
-          <p:cNvPr id="6" name="Espace réservé du numéro de diapositive 5"/>
+            <a:endParaRPr lang="ru-RU"/>
+          </a:p>
+        </p:txBody>
+      </p:sp>
+      <p:sp>
+        <p:nvSpPr>
+          <p:cNvPr id="6" name="Номер слайда 5"/>
           <p:cNvSpPr>
             <a:spLocks noGrp="1"/>
           </p:cNvSpPr>
@@ -1498,10 +1498,10 @@
           <a:lstStyle/>
           <a:p>
             <a:fld id="{08395586-F03A-48D1-94DF-16B239DF4FB5}" type="slidenum">
-              <a:rPr lang="fr-FR" smtClean="0"/>
+              <a:rPr lang="ru-RU" smtClean="0"/>
               <a:t>‹#›</a:t>
             </a:fld>
-            <a:endParaRPr lang="fr-FR"/>
+            <a:endParaRPr lang="ru-RU"/>
           </a:p>
         </p:txBody>
       </p:sp>
@@ -1520,7 +1520,7 @@
 
 <file path=ppt/slideLayouts/slideLayout4.xml><?xml version="1.0" encoding="utf-8"?>
 <p:sldLayout xmlns:a="http://schemas.openxmlformats.org/drawingml/2006/main" xmlns:r="http://schemas.openxmlformats.org/officeDocument/2006/relationships" xmlns:p="http://schemas.openxmlformats.org/presentationml/2006/main" type="twoObj" preserve="1">
-  <p:cSld name="Deux contenus">
+  <p:cSld name="Два объекта">
     <p:spTree>
       <p:nvGrpSpPr>
         <p:cNvPr id="1" name=""/>
@@ -1537,7 +1537,7 @@
       </p:grpSpPr>
       <p:sp>
         <p:nvSpPr>
-          <p:cNvPr id="2" name="Titre 1"/>
+          <p:cNvPr id="2" name="Заголовок 1"/>
           <p:cNvSpPr>
             <a:spLocks noGrp="1"/>
           </p:cNvSpPr>
@@ -1551,16 +1551,16 @@
           <a:lstStyle/>
           <a:p>
             <a:r>
-              <a:rPr lang="fr-FR" smtClean="0"/>
-              <a:t>Modifiez le style du titre</a:t>
-            </a:r>
-            <a:endParaRPr lang="fr-FR" dirty="0"/>
-          </a:p>
-        </p:txBody>
-      </p:sp>
-      <p:sp>
-        <p:nvSpPr>
-          <p:cNvPr id="3" name="Espace réservé du contenu 2"/>
+              <a:rPr lang="ru-RU" smtClean="0"/>
+              <a:t>Образец заголовка</a:t>
+            </a:r>
+            <a:endParaRPr lang="ru-RU" dirty="0"/>
+          </a:p>
+        </p:txBody>
+      </p:sp>
+      <p:sp>
+        <p:nvSpPr>
+          <p:cNvPr id="3" name="Объект 2"/>
           <p:cNvSpPr>
             <a:spLocks noGrp="1"/>
           </p:cNvSpPr>
@@ -1580,44 +1580,44 @@
           <a:p>
             <a:pPr lvl="0"/>
             <a:r>
-              <a:rPr lang="fr-FR" smtClean="0"/>
-              <a:t>Modifiez les styles du texte du masque</a:t>
+              <a:rPr lang="ru-RU" smtClean="0"/>
+              <a:t>Образец текста</a:t>
             </a:r>
           </a:p>
           <a:p>
             <a:pPr lvl="1"/>
             <a:r>
-              <a:rPr lang="fr-FR" smtClean="0"/>
-              <a:t>Deuxième niveau</a:t>
+              <a:rPr lang="ru-RU" smtClean="0"/>
+              <a:t>Второй уровень</a:t>
             </a:r>
           </a:p>
           <a:p>
             <a:pPr lvl="2"/>
             <a:r>
-              <a:rPr lang="fr-FR" smtClean="0"/>
-              <a:t>Troisième niveau</a:t>
+              <a:rPr lang="ru-RU" smtClean="0"/>
+              <a:t>Третий уровень</a:t>
             </a:r>
           </a:p>
           <a:p>
             <a:pPr lvl="3"/>
             <a:r>
-              <a:rPr lang="fr-FR" smtClean="0"/>
-              <a:t>Quatrième niveau</a:t>
+              <a:rPr lang="ru-RU" smtClean="0"/>
+              <a:t>Четвертый уровень</a:t>
             </a:r>
           </a:p>
           <a:p>
             <a:pPr lvl="4"/>
             <a:r>
-              <a:rPr lang="fr-FR" smtClean="0"/>
-              <a:t>Cinquième niveau</a:t>
-            </a:r>
-            <a:endParaRPr lang="fr-FR" dirty="0"/>
-          </a:p>
-        </p:txBody>
-      </p:sp>
-      <p:sp>
-        <p:nvSpPr>
-          <p:cNvPr id="4" name="Espace réservé du contenu 3"/>
+              <a:rPr lang="ru-RU" smtClean="0"/>
+              <a:t>Пятый уровень</a:t>
+            </a:r>
+            <a:endParaRPr lang="ru-RU" dirty="0"/>
+          </a:p>
+        </p:txBody>
+      </p:sp>
+      <p:sp>
+        <p:nvSpPr>
+          <p:cNvPr id="4" name="Объект 3"/>
           <p:cNvSpPr>
             <a:spLocks noGrp="1"/>
           </p:cNvSpPr>
@@ -1637,44 +1637,44 @@
           <a:p>
             <a:pPr lvl="0"/>
             <a:r>
-              <a:rPr lang="fr-FR" smtClean="0"/>
-              <a:t>Modifiez les styles du texte du masque</a:t>
+              <a:rPr lang="ru-RU" smtClean="0"/>
+              <a:t>Образец текста</a:t>
             </a:r>
           </a:p>
           <a:p>
             <a:pPr lvl="1"/>
             <a:r>
-              <a:rPr lang="fr-FR" smtClean="0"/>
-              <a:t>Deuxième niveau</a:t>
+              <a:rPr lang="ru-RU" smtClean="0"/>
+              <a:t>Второй уровень</a:t>
             </a:r>
           </a:p>
           <a:p>
             <a:pPr lvl="2"/>
             <a:r>
-              <a:rPr lang="fr-FR" smtClean="0"/>
-              <a:t>Troisième niveau</a:t>
+              <a:rPr lang="ru-RU" smtClean="0"/>
+              <a:t>Третий уровень</a:t>
             </a:r>
           </a:p>
           <a:p>
             <a:pPr lvl="3"/>
             <a:r>
-              <a:rPr lang="fr-FR" smtClean="0"/>
-              <a:t>Quatrième niveau</a:t>
+              <a:rPr lang="ru-RU" smtClean="0"/>
+              <a:t>Четвертый уровень</a:t>
             </a:r>
           </a:p>
           <a:p>
             <a:pPr lvl="4"/>
             <a:r>
-              <a:rPr lang="fr-FR" smtClean="0"/>
-              <a:t>Cinquième niveau</a:t>
-            </a:r>
-            <a:endParaRPr lang="fr-FR" dirty="0"/>
-          </a:p>
-        </p:txBody>
-      </p:sp>
-      <p:sp>
-        <p:nvSpPr>
-          <p:cNvPr id="5" name="Espace réservé de la date 4"/>
+              <a:rPr lang="ru-RU" smtClean="0"/>
+              <a:t>Пятый уровень</a:t>
+            </a:r>
+            <a:endParaRPr lang="ru-RU" dirty="0"/>
+          </a:p>
+        </p:txBody>
+      </p:sp>
+      <p:sp>
+        <p:nvSpPr>
+          <p:cNvPr id="5" name="Дата 4"/>
           <p:cNvSpPr>
             <a:spLocks noGrp="1"/>
           </p:cNvSpPr>
@@ -1688,16 +1688,16 @@
           <a:lstStyle/>
           <a:p>
             <a:fld id="{BCC18F51-09EC-435C-A3BA-64A766E099C0}" type="datetimeFigureOut">
-              <a:rPr lang="fr-FR" smtClean="0"/>
+              <a:rPr lang="ru-RU" smtClean="0"/>
               <a:t>30.10.2013</a:t>
             </a:fld>
-            <a:endParaRPr lang="fr-FR"/>
-          </a:p>
-        </p:txBody>
-      </p:sp>
-      <p:sp>
-        <p:nvSpPr>
-          <p:cNvPr id="6" name="Espace réservé du pied de page 5"/>
+            <a:endParaRPr lang="ru-RU"/>
+          </a:p>
+        </p:txBody>
+      </p:sp>
+      <p:sp>
+        <p:nvSpPr>
+          <p:cNvPr id="6" name="Нижний колонтитул 5"/>
           <p:cNvSpPr>
             <a:spLocks noGrp="1"/>
           </p:cNvSpPr>
@@ -1710,13 +1710,13 @@
           <a:bodyPr/>
           <a:lstStyle/>
           <a:p>
-            <a:endParaRPr lang="fr-FR"/>
-          </a:p>
-        </p:txBody>
-      </p:sp>
-      <p:sp>
-        <p:nvSpPr>
-          <p:cNvPr id="7" name="Espace réservé du numéro de diapositive 6"/>
+            <a:endParaRPr lang="ru-RU"/>
+          </a:p>
+        </p:txBody>
+      </p:sp>
+      <p:sp>
+        <p:nvSpPr>
+          <p:cNvPr id="7" name="Номер слайда 6"/>
           <p:cNvSpPr>
             <a:spLocks noGrp="1"/>
           </p:cNvSpPr>
@@ -1730,10 +1730,10 @@
           <a:lstStyle/>
           <a:p>
             <a:fld id="{08395586-F03A-48D1-94DF-16B239DF4FB5}" type="slidenum">
-              <a:rPr lang="fr-FR" smtClean="0"/>
+              <a:rPr lang="ru-RU" smtClean="0"/>
               <a:t>‹#›</a:t>
             </a:fld>
-            <a:endParaRPr lang="fr-FR"/>
+            <a:endParaRPr lang="ru-RU"/>
           </a:p>
         </p:txBody>
       </p:sp>
@@ -1752,7 +1752,7 @@
 
 <file path=ppt/slideLayouts/slideLayout5.xml><?xml version="1.0" encoding="utf-8"?>
 <p:sldLayout xmlns:a="http://schemas.openxmlformats.org/drawingml/2006/main" xmlns:r="http://schemas.openxmlformats.org/officeDocument/2006/relationships" xmlns:p="http://schemas.openxmlformats.org/presentationml/2006/main" type="twoTxTwoObj" preserve="1">
-  <p:cSld name="Comparaison">
+  <p:cSld name="Сравнение">
     <p:spTree>
       <p:nvGrpSpPr>
         <p:cNvPr id="1" name=""/>
@@ -1769,7 +1769,7 @@
       </p:grpSpPr>
       <p:sp>
         <p:nvSpPr>
-          <p:cNvPr id="2" name="Titre 1"/>
+          <p:cNvPr id="2" name="Заголовок 1"/>
           <p:cNvSpPr>
             <a:spLocks noGrp="1"/>
           </p:cNvSpPr>
@@ -1788,16 +1788,16 @@
           <a:lstStyle/>
           <a:p>
             <a:r>
-              <a:rPr lang="fr-FR" smtClean="0"/>
-              <a:t>Modifiez le style du titre</a:t>
-            </a:r>
-            <a:endParaRPr lang="fr-FR" dirty="0"/>
-          </a:p>
-        </p:txBody>
-      </p:sp>
-      <p:sp>
-        <p:nvSpPr>
-          <p:cNvPr id="3" name="Espace réservé du texte 2"/>
+              <a:rPr lang="ru-RU" smtClean="0"/>
+              <a:t>Образец заголовка</a:t>
+            </a:r>
+            <a:endParaRPr lang="ru-RU" dirty="0"/>
+          </a:p>
+        </p:txBody>
+      </p:sp>
+      <p:sp>
+        <p:nvSpPr>
+          <p:cNvPr id="3" name="Текст 2"/>
           <p:cNvSpPr>
             <a:spLocks noGrp="1"/>
           </p:cNvSpPr>
@@ -1854,15 +1854,15 @@
           <a:p>
             <a:pPr lvl="0"/>
             <a:r>
-              <a:rPr lang="fr-FR" smtClean="0"/>
-              <a:t>Modifiez les styles du texte du masque</a:t>
-            </a:r>
-          </a:p>
-        </p:txBody>
-      </p:sp>
-      <p:sp>
-        <p:nvSpPr>
-          <p:cNvPr id="4" name="Espace réservé du contenu 3"/>
+              <a:rPr lang="ru-RU" smtClean="0"/>
+              <a:t>Образец текста</a:t>
+            </a:r>
+          </a:p>
+        </p:txBody>
+      </p:sp>
+      <p:sp>
+        <p:nvSpPr>
+          <p:cNvPr id="4" name="Объект 3"/>
           <p:cNvSpPr>
             <a:spLocks noGrp="1"/>
           </p:cNvSpPr>
@@ -1882,44 +1882,44 @@
           <a:p>
             <a:pPr lvl="0"/>
             <a:r>
-              <a:rPr lang="fr-FR" smtClean="0"/>
-              <a:t>Modifiez les styles du texte du masque</a:t>
+              <a:rPr lang="ru-RU" smtClean="0"/>
+              <a:t>Образец текста</a:t>
             </a:r>
           </a:p>
           <a:p>
             <a:pPr lvl="1"/>
             <a:r>
-              <a:rPr lang="fr-FR" smtClean="0"/>
-              <a:t>Deuxième niveau</a:t>
+              <a:rPr lang="ru-RU" smtClean="0"/>
+              <a:t>Второй уровень</a:t>
             </a:r>
           </a:p>
           <a:p>
             <a:pPr lvl="2"/>
             <a:r>
-              <a:rPr lang="fr-FR" smtClean="0"/>
-              <a:t>Troisième niveau</a:t>
+              <a:rPr lang="ru-RU" smtClean="0"/>
+              <a:t>Третий уровень</a:t>
             </a:r>
           </a:p>
           <a:p>
             <a:pPr lvl="3"/>
             <a:r>
-              <a:rPr lang="fr-FR" smtClean="0"/>
-              <a:t>Quatrième niveau</a:t>
+              <a:rPr lang="ru-RU" smtClean="0"/>
+              <a:t>Четвертый уровень</a:t>
             </a:r>
           </a:p>
           <a:p>
             <a:pPr lvl="4"/>
             <a:r>
-              <a:rPr lang="fr-FR" smtClean="0"/>
-              <a:t>Cinquième niveau</a:t>
-            </a:r>
-            <a:endParaRPr lang="fr-FR" dirty="0"/>
-          </a:p>
-        </p:txBody>
-      </p:sp>
-      <p:sp>
-        <p:nvSpPr>
-          <p:cNvPr id="5" name="Espace réservé du texte 4"/>
+              <a:rPr lang="ru-RU" smtClean="0"/>
+              <a:t>Пятый уровень</a:t>
+            </a:r>
+            <a:endParaRPr lang="ru-RU" dirty="0"/>
+          </a:p>
+        </p:txBody>
+      </p:sp>
+      <p:sp>
+        <p:nvSpPr>
+          <p:cNvPr id="5" name="Текст 4"/>
           <p:cNvSpPr>
             <a:spLocks noGrp="1"/>
           </p:cNvSpPr>
@@ -1976,15 +1976,15 @@
           <a:p>
             <a:pPr lvl="0"/>
             <a:r>
-              <a:rPr lang="fr-FR" smtClean="0"/>
-              <a:t>Modifiez les styles du texte du masque</a:t>
-            </a:r>
-          </a:p>
-        </p:txBody>
-      </p:sp>
-      <p:sp>
-        <p:nvSpPr>
-          <p:cNvPr id="6" name="Espace réservé du contenu 5"/>
+              <a:rPr lang="ru-RU" smtClean="0"/>
+              <a:t>Образец текста</a:t>
+            </a:r>
+          </a:p>
+        </p:txBody>
+      </p:sp>
+      <p:sp>
+        <p:nvSpPr>
+          <p:cNvPr id="6" name="Объект 5"/>
           <p:cNvSpPr>
             <a:spLocks noGrp="1"/>
           </p:cNvSpPr>
@@ -2004,44 +2004,44 @@
           <a:p>
             <a:pPr lvl="0"/>
             <a:r>
-              <a:rPr lang="fr-FR" smtClean="0"/>
-              <a:t>Modifiez les styles du texte du masque</a:t>
+              <a:rPr lang="ru-RU" smtClean="0"/>
+              <a:t>Образец текста</a:t>
             </a:r>
           </a:p>
           <a:p>
             <a:pPr lvl="1"/>
             <a:r>
-              <a:rPr lang="fr-FR" smtClean="0"/>
-              <a:t>Deuxième niveau</a:t>
+              <a:rPr lang="ru-RU" smtClean="0"/>
+              <a:t>Второй уровень</a:t>
             </a:r>
           </a:p>
           <a:p>
             <a:pPr lvl="2"/>
             <a:r>
-              <a:rPr lang="fr-FR" smtClean="0"/>
-              <a:t>Troisième niveau</a:t>
+              <a:rPr lang="ru-RU" smtClean="0"/>
+              <a:t>Третий уровень</a:t>
             </a:r>
           </a:p>
           <a:p>
             <a:pPr lvl="3"/>
             <a:r>
-              <a:rPr lang="fr-FR" smtClean="0"/>
-              <a:t>Quatrième niveau</a:t>
+              <a:rPr lang="ru-RU" smtClean="0"/>
+              <a:t>Четвертый уровень</a:t>
             </a:r>
           </a:p>
           <a:p>
             <a:pPr lvl="4"/>
             <a:r>
-              <a:rPr lang="fr-FR" smtClean="0"/>
-              <a:t>Cinquième niveau</a:t>
-            </a:r>
-            <a:endParaRPr lang="fr-FR" dirty="0"/>
-          </a:p>
-        </p:txBody>
-      </p:sp>
-      <p:sp>
-        <p:nvSpPr>
-          <p:cNvPr id="7" name="Espace réservé de la date 6"/>
+              <a:rPr lang="ru-RU" smtClean="0"/>
+              <a:t>Пятый уровень</a:t>
+            </a:r>
+            <a:endParaRPr lang="ru-RU" dirty="0"/>
+          </a:p>
+        </p:txBody>
+      </p:sp>
+      <p:sp>
+        <p:nvSpPr>
+          <p:cNvPr id="7" name="Дата 6"/>
           <p:cNvSpPr>
             <a:spLocks noGrp="1"/>
           </p:cNvSpPr>
@@ -2055,16 +2055,16 @@
           <a:lstStyle/>
           <a:p>
             <a:fld id="{BCC18F51-09EC-435C-A3BA-64A766E099C0}" type="datetimeFigureOut">
-              <a:rPr lang="fr-FR" smtClean="0"/>
+              <a:rPr lang="ru-RU" smtClean="0"/>
               <a:t>30.10.2013</a:t>
             </a:fld>
-            <a:endParaRPr lang="fr-FR"/>
-          </a:p>
-        </p:txBody>
-      </p:sp>
-      <p:sp>
-        <p:nvSpPr>
-          <p:cNvPr id="8" name="Espace réservé du pied de page 7"/>
+            <a:endParaRPr lang="ru-RU"/>
+          </a:p>
+        </p:txBody>
+      </p:sp>
+      <p:sp>
+        <p:nvSpPr>
+          <p:cNvPr id="8" name="Нижний колонтитул 7"/>
           <p:cNvSpPr>
             <a:spLocks noGrp="1"/>
           </p:cNvSpPr>
@@ -2077,13 +2077,13 @@
           <a:bodyPr/>
           <a:lstStyle/>
           <a:p>
-            <a:endParaRPr lang="fr-FR"/>
-          </a:p>
-        </p:txBody>
-      </p:sp>
-      <p:sp>
-        <p:nvSpPr>
-          <p:cNvPr id="9" name="Espace réservé du numéro de diapositive 8"/>
+            <a:endParaRPr lang="ru-RU"/>
+          </a:p>
+        </p:txBody>
+      </p:sp>
+      <p:sp>
+        <p:nvSpPr>
+          <p:cNvPr id="9" name="Номер слайда 8"/>
           <p:cNvSpPr>
             <a:spLocks noGrp="1"/>
           </p:cNvSpPr>
@@ -2097,10 +2097,10 @@
           <a:lstStyle/>
           <a:p>
             <a:fld id="{08395586-F03A-48D1-94DF-16B239DF4FB5}" type="slidenum">
-              <a:rPr lang="fr-FR" smtClean="0"/>
+              <a:rPr lang="ru-RU" smtClean="0"/>
               <a:t>‹#›</a:t>
             </a:fld>
-            <a:endParaRPr lang="fr-FR"/>
+            <a:endParaRPr lang="ru-RU"/>
           </a:p>
         </p:txBody>
       </p:sp>
@@ -2119,7 +2119,7 @@
 
 <file path=ppt/slideLayouts/slideLayout6.xml><?xml version="1.0" encoding="utf-8"?>
 <p:sldLayout xmlns:a="http://schemas.openxmlformats.org/drawingml/2006/main" xmlns:r="http://schemas.openxmlformats.org/officeDocument/2006/relationships" xmlns:p="http://schemas.openxmlformats.org/presentationml/2006/main" type="titleOnly" preserve="1">
-  <p:cSld name="Titre seul">
+  <p:cSld name="Только заголовок">
     <p:spTree>
       <p:nvGrpSpPr>
         <p:cNvPr id="1" name=""/>
@@ -2136,7 +2136,7 @@
       </p:grpSpPr>
       <p:sp>
         <p:nvSpPr>
-          <p:cNvPr id="2" name="Titre 1"/>
+          <p:cNvPr id="2" name="Заголовок 1"/>
           <p:cNvSpPr>
             <a:spLocks noGrp="1"/>
           </p:cNvSpPr>
@@ -2150,16 +2150,16 @@
           <a:lstStyle/>
           <a:p>
             <a:r>
-              <a:rPr lang="fr-FR" smtClean="0"/>
-              <a:t>Modifiez le style du titre</a:t>
-            </a:r>
-            <a:endParaRPr lang="fr-FR" dirty="0"/>
-          </a:p>
-        </p:txBody>
-      </p:sp>
-      <p:sp>
-        <p:nvSpPr>
-          <p:cNvPr id="3" name="Espace réservé de la date 2"/>
+              <a:rPr lang="ru-RU" smtClean="0"/>
+              <a:t>Образец заголовка</a:t>
+            </a:r>
+            <a:endParaRPr lang="ru-RU" dirty="0"/>
+          </a:p>
+        </p:txBody>
+      </p:sp>
+      <p:sp>
+        <p:nvSpPr>
+          <p:cNvPr id="3" name="Дата 2"/>
           <p:cNvSpPr>
             <a:spLocks noGrp="1"/>
           </p:cNvSpPr>
@@ -2173,16 +2173,16 @@
           <a:lstStyle/>
           <a:p>
             <a:fld id="{BCC18F51-09EC-435C-A3BA-64A766E099C0}" type="datetimeFigureOut">
-              <a:rPr lang="fr-FR" smtClean="0"/>
+              <a:rPr lang="ru-RU" smtClean="0"/>
               <a:t>30.10.2013</a:t>
             </a:fld>
-            <a:endParaRPr lang="fr-FR"/>
-          </a:p>
-        </p:txBody>
-      </p:sp>
-      <p:sp>
-        <p:nvSpPr>
-          <p:cNvPr id="4" name="Espace réservé du pied de page 3"/>
+            <a:endParaRPr lang="ru-RU"/>
+          </a:p>
+        </p:txBody>
+      </p:sp>
+      <p:sp>
+        <p:nvSpPr>
+          <p:cNvPr id="4" name="Нижний колонтитул 3"/>
           <p:cNvSpPr>
             <a:spLocks noGrp="1"/>
           </p:cNvSpPr>
@@ -2195,13 +2195,13 @@
           <a:bodyPr/>
           <a:lstStyle/>
           <a:p>
-            <a:endParaRPr lang="fr-FR"/>
-          </a:p>
-        </p:txBody>
-      </p:sp>
-      <p:sp>
-        <p:nvSpPr>
-          <p:cNvPr id="5" name="Espace réservé du numéro de diapositive 4"/>
+            <a:endParaRPr lang="ru-RU"/>
+          </a:p>
+        </p:txBody>
+      </p:sp>
+      <p:sp>
+        <p:nvSpPr>
+          <p:cNvPr id="5" name="Номер слайда 4"/>
           <p:cNvSpPr>
             <a:spLocks noGrp="1"/>
           </p:cNvSpPr>
@@ -2215,10 +2215,10 @@
           <a:lstStyle/>
           <a:p>
             <a:fld id="{08395586-F03A-48D1-94DF-16B239DF4FB5}" type="slidenum">
-              <a:rPr lang="fr-FR" smtClean="0"/>
+              <a:rPr lang="ru-RU" smtClean="0"/>
               <a:t>‹#›</a:t>
             </a:fld>
-            <a:endParaRPr lang="fr-FR"/>
+            <a:endParaRPr lang="ru-RU"/>
           </a:p>
         </p:txBody>
       </p:sp>
@@ -2237,7 +2237,7 @@
 
 <file path=ppt/slideLayouts/slideLayout7.xml><?xml version="1.0" encoding="utf-8"?>
 <p:sldLayout xmlns:a="http://schemas.openxmlformats.org/drawingml/2006/main" xmlns:r="http://schemas.openxmlformats.org/officeDocument/2006/relationships" xmlns:p="http://schemas.openxmlformats.org/presentationml/2006/main" type="blank" preserve="1">
-  <p:cSld name="Vide">
+  <p:cSld name="Пустой слайд">
     <p:spTree>
       <p:nvGrpSpPr>
         <p:cNvPr id="1" name=""/>
@@ -2254,7 +2254,7 @@
       </p:grpSpPr>
       <p:sp>
         <p:nvSpPr>
-          <p:cNvPr id="2" name="Espace réservé de la date 1"/>
+          <p:cNvPr id="2" name="Дата 1"/>
           <p:cNvSpPr>
             <a:spLocks noGrp="1"/>
           </p:cNvSpPr>
@@ -2268,16 +2268,16 @@
           <a:lstStyle/>
           <a:p>
             <a:fld id="{BCC18F51-09EC-435C-A3BA-64A766E099C0}" type="datetimeFigureOut">
-              <a:rPr lang="fr-FR" smtClean="0"/>
+              <a:rPr lang="ru-RU" smtClean="0"/>
               <a:t>30.10.2013</a:t>
             </a:fld>
-            <a:endParaRPr lang="fr-FR"/>
-          </a:p>
-        </p:txBody>
-      </p:sp>
-      <p:sp>
-        <p:nvSpPr>
-          <p:cNvPr id="3" name="Espace réservé du pied de page 2"/>
+            <a:endParaRPr lang="ru-RU"/>
+          </a:p>
+        </p:txBody>
+      </p:sp>
+      <p:sp>
+        <p:nvSpPr>
+          <p:cNvPr id="3" name="Нижний колонтитул 2"/>
           <p:cNvSpPr>
             <a:spLocks noGrp="1"/>
           </p:cNvSpPr>
@@ -2290,13 +2290,13 @@
           <a:bodyPr/>
           <a:lstStyle/>
           <a:p>
-            <a:endParaRPr lang="fr-FR"/>
-          </a:p>
-        </p:txBody>
-      </p:sp>
-      <p:sp>
-        <p:nvSpPr>
-          <p:cNvPr id="4" name="Espace réservé du numéro de diapositive 3"/>
+            <a:endParaRPr lang="ru-RU"/>
+          </a:p>
+        </p:txBody>
+      </p:sp>
+      <p:sp>
+        <p:nvSpPr>
+          <p:cNvPr id="4" name="Номер слайда 3"/>
           <p:cNvSpPr>
             <a:spLocks noGrp="1"/>
           </p:cNvSpPr>
@@ -2310,10 +2310,10 @@
           <a:lstStyle/>
           <a:p>
             <a:fld id="{08395586-F03A-48D1-94DF-16B239DF4FB5}" type="slidenum">
-              <a:rPr lang="fr-FR" smtClean="0"/>
+              <a:rPr lang="ru-RU" smtClean="0"/>
               <a:t>‹#›</a:t>
             </a:fld>
-            <a:endParaRPr lang="fr-FR"/>
+            <a:endParaRPr lang="ru-RU"/>
           </a:p>
         </p:txBody>
       </p:sp>
@@ -2332,7 +2332,7 @@
 
 <file path=ppt/slideLayouts/slideLayout8.xml><?xml version="1.0" encoding="utf-8"?>
 <p:sldLayout xmlns:a="http://schemas.openxmlformats.org/drawingml/2006/main" xmlns:r="http://schemas.openxmlformats.org/officeDocument/2006/relationships" xmlns:p="http://schemas.openxmlformats.org/presentationml/2006/main" type="objTx" preserve="1">
-  <p:cSld name="Contenu avec légende">
+  <p:cSld name="Объект с подписью">
     <p:spTree>
       <p:nvGrpSpPr>
         <p:cNvPr id="1" name=""/>
@@ -2349,7 +2349,7 @@
       </p:grpSpPr>
       <p:sp>
         <p:nvSpPr>
-          <p:cNvPr id="2" name="Titre 1"/>
+          <p:cNvPr id="2" name="Заголовок 1"/>
           <p:cNvSpPr>
             <a:spLocks noGrp="1"/>
           </p:cNvSpPr>
@@ -2372,16 +2372,16 @@
           </a:lstStyle>
           <a:p>
             <a:r>
-              <a:rPr lang="fr-FR" smtClean="0"/>
-              <a:t>Modifiez le style du titre</a:t>
-            </a:r>
-            <a:endParaRPr lang="fr-FR" dirty="0"/>
-          </a:p>
-        </p:txBody>
-      </p:sp>
-      <p:sp>
-        <p:nvSpPr>
-          <p:cNvPr id="3" name="Espace réservé du contenu 2"/>
+              <a:rPr lang="ru-RU" smtClean="0"/>
+              <a:t>Образец заголовка</a:t>
+            </a:r>
+            <a:endParaRPr lang="ru-RU" dirty="0"/>
+          </a:p>
+        </p:txBody>
+      </p:sp>
+      <p:sp>
+        <p:nvSpPr>
+          <p:cNvPr id="3" name="Объект 2"/>
           <p:cNvSpPr>
             <a:spLocks noGrp="1"/>
           </p:cNvSpPr>
@@ -2429,44 +2429,44 @@
           <a:p>
             <a:pPr lvl="0"/>
             <a:r>
-              <a:rPr lang="fr-FR" smtClean="0"/>
-              <a:t>Modifiez les styles du texte du masque</a:t>
+              <a:rPr lang="ru-RU" smtClean="0"/>
+              <a:t>Образец текста</a:t>
             </a:r>
           </a:p>
           <a:p>
             <a:pPr lvl="1"/>
             <a:r>
-              <a:rPr lang="fr-FR" smtClean="0"/>
-              <a:t>Deuxième niveau</a:t>
+              <a:rPr lang="ru-RU" smtClean="0"/>
+              <a:t>Второй уровень</a:t>
             </a:r>
           </a:p>
           <a:p>
             <a:pPr lvl="2"/>
             <a:r>
-              <a:rPr lang="fr-FR" smtClean="0"/>
-              <a:t>Troisième niveau</a:t>
+              <a:rPr lang="ru-RU" smtClean="0"/>
+              <a:t>Третий уровень</a:t>
             </a:r>
           </a:p>
           <a:p>
             <a:pPr lvl="3"/>
             <a:r>
-              <a:rPr lang="fr-FR" smtClean="0"/>
-              <a:t>Quatrième niveau</a:t>
+              <a:rPr lang="ru-RU" smtClean="0"/>
+              <a:t>Четвертый уровень</a:t>
             </a:r>
           </a:p>
           <a:p>
             <a:pPr lvl="4"/>
             <a:r>
-              <a:rPr lang="fr-FR" smtClean="0"/>
-              <a:t>Cinquième niveau</a:t>
-            </a:r>
-            <a:endParaRPr lang="fr-FR" dirty="0"/>
-          </a:p>
-        </p:txBody>
-      </p:sp>
-      <p:sp>
-        <p:nvSpPr>
-          <p:cNvPr id="4" name="Espace réservé du texte 3"/>
+              <a:rPr lang="ru-RU" smtClean="0"/>
+              <a:t>Пятый уровень</a:t>
+            </a:r>
+            <a:endParaRPr lang="ru-RU" dirty="0"/>
+          </a:p>
+        </p:txBody>
+      </p:sp>
+      <p:sp>
+        <p:nvSpPr>
+          <p:cNvPr id="4" name="Текст 3"/>
           <p:cNvSpPr>
             <a:spLocks noGrp="1"/>
           </p:cNvSpPr>
@@ -2523,15 +2523,15 @@
           <a:p>
             <a:pPr lvl="0"/>
             <a:r>
-              <a:rPr lang="fr-FR" smtClean="0"/>
-              <a:t>Modifiez les styles du texte du masque</a:t>
-            </a:r>
-          </a:p>
-        </p:txBody>
-      </p:sp>
-      <p:sp>
-        <p:nvSpPr>
-          <p:cNvPr id="5" name="Espace réservé de la date 4"/>
+              <a:rPr lang="ru-RU" smtClean="0"/>
+              <a:t>Образец текста</a:t>
+            </a:r>
+          </a:p>
+        </p:txBody>
+      </p:sp>
+      <p:sp>
+        <p:nvSpPr>
+          <p:cNvPr id="5" name="Дата 4"/>
           <p:cNvSpPr>
             <a:spLocks noGrp="1"/>
           </p:cNvSpPr>
@@ -2545,16 +2545,16 @@
           <a:lstStyle/>
           <a:p>
             <a:fld id="{BCC18F51-09EC-435C-A3BA-64A766E099C0}" type="datetimeFigureOut">
-              <a:rPr lang="fr-FR" smtClean="0"/>
+              <a:rPr lang="ru-RU" smtClean="0"/>
               <a:t>30.10.2013</a:t>
             </a:fld>
-            <a:endParaRPr lang="fr-FR"/>
-          </a:p>
-        </p:txBody>
-      </p:sp>
-      <p:sp>
-        <p:nvSpPr>
-          <p:cNvPr id="6" name="Espace réservé du pied de page 5"/>
+            <a:endParaRPr lang="ru-RU"/>
+          </a:p>
+        </p:txBody>
+      </p:sp>
+      <p:sp>
+        <p:nvSpPr>
+          <p:cNvPr id="6" name="Нижний колонтитул 5"/>
           <p:cNvSpPr>
             <a:spLocks noGrp="1"/>
           </p:cNvSpPr>
@@ -2567,13 +2567,13 @@
           <a:bodyPr/>
           <a:lstStyle/>
           <a:p>
-            <a:endParaRPr lang="fr-FR"/>
-          </a:p>
-        </p:txBody>
-      </p:sp>
-      <p:sp>
-        <p:nvSpPr>
-          <p:cNvPr id="7" name="Espace réservé du numéro de diapositive 6"/>
+            <a:endParaRPr lang="ru-RU"/>
+          </a:p>
+        </p:txBody>
+      </p:sp>
+      <p:sp>
+        <p:nvSpPr>
+          <p:cNvPr id="7" name="Номер слайда 6"/>
           <p:cNvSpPr>
             <a:spLocks noGrp="1"/>
           </p:cNvSpPr>
@@ -2587,10 +2587,10 @@
           <a:lstStyle/>
           <a:p>
             <a:fld id="{08395586-F03A-48D1-94DF-16B239DF4FB5}" type="slidenum">
-              <a:rPr lang="fr-FR" smtClean="0"/>
+              <a:rPr lang="ru-RU" smtClean="0"/>
               <a:t>‹#›</a:t>
             </a:fld>
-            <a:endParaRPr lang="fr-FR"/>
+            <a:endParaRPr lang="ru-RU"/>
           </a:p>
         </p:txBody>
       </p:sp>
@@ -2609,7 +2609,7 @@
 
 <file path=ppt/slideLayouts/slideLayout9.xml><?xml version="1.0" encoding="utf-8"?>
 <p:sldLayout xmlns:a="http://schemas.openxmlformats.org/drawingml/2006/main" xmlns:r="http://schemas.openxmlformats.org/officeDocument/2006/relationships" xmlns:p="http://schemas.openxmlformats.org/presentationml/2006/main" type="picTx" preserve="1">
-  <p:cSld name="Image avec légende">
+  <p:cSld name="Рисунок с подписью">
     <p:spTree>
       <p:nvGrpSpPr>
         <p:cNvPr id="1" name=""/>
@@ -2626,7 +2626,7 @@
       </p:grpSpPr>
       <p:sp>
         <p:nvSpPr>
-          <p:cNvPr id="2" name="Titre 1"/>
+          <p:cNvPr id="2" name="Заголовок 1"/>
           <p:cNvSpPr>
             <a:spLocks noGrp="1"/>
           </p:cNvSpPr>
@@ -2649,16 +2649,16 @@
           </a:lstStyle>
           <a:p>
             <a:r>
-              <a:rPr lang="fr-FR" smtClean="0"/>
-              <a:t>Modifiez le style du titre</a:t>
-            </a:r>
-            <a:endParaRPr lang="fr-FR" dirty="0"/>
-          </a:p>
-        </p:txBody>
-      </p:sp>
-      <p:sp>
-        <p:nvSpPr>
-          <p:cNvPr id="3" name="Espace réservé pour une image 2"/>
+              <a:rPr lang="ru-RU" smtClean="0"/>
+              <a:t>Образец заголовка</a:t>
+            </a:r>
+            <a:endParaRPr lang="ru-RU" dirty="0"/>
+          </a:p>
+        </p:txBody>
+      </p:sp>
+      <p:sp>
+        <p:nvSpPr>
+          <p:cNvPr id="3" name="Рисунок 2"/>
           <p:cNvSpPr>
             <a:spLocks noGrp="1" noChangeAspect="1"/>
           </p:cNvSpPr>
@@ -2714,16 +2714,16 @@
           </a:lstStyle>
           <a:p>
             <a:r>
-              <a:rPr lang="fr-FR" smtClean="0"/>
-              <a:t>Cliquez sur l'icône pour ajouter une image</a:t>
-            </a:r>
-            <a:endParaRPr lang="fr-FR" dirty="0"/>
-          </a:p>
-        </p:txBody>
-      </p:sp>
-      <p:sp>
-        <p:nvSpPr>
-          <p:cNvPr id="4" name="Espace réservé du texte 3"/>
+              <a:rPr lang="ru-RU" smtClean="0"/>
+              <a:t>Нажмите, чтобы добавить изображение</a:t>
+            </a:r>
+            <a:endParaRPr lang="ru-RU" dirty="0"/>
+          </a:p>
+        </p:txBody>
+      </p:sp>
+      <p:sp>
+        <p:nvSpPr>
+          <p:cNvPr id="4" name="Текст 3"/>
           <p:cNvSpPr>
             <a:spLocks noGrp="1"/>
           </p:cNvSpPr>
@@ -2780,15 +2780,15 @@
           <a:p>
             <a:pPr lvl="0"/>
             <a:r>
-              <a:rPr lang="fr-FR" smtClean="0"/>
-              <a:t>Modifiez les styles du texte du masque</a:t>
-            </a:r>
-          </a:p>
-        </p:txBody>
-      </p:sp>
-      <p:sp>
-        <p:nvSpPr>
-          <p:cNvPr id="5" name="Espace réservé de la date 4"/>
+              <a:rPr lang="ru-RU" smtClean="0"/>
+              <a:t>Образец текста</a:t>
+            </a:r>
+          </a:p>
+        </p:txBody>
+      </p:sp>
+      <p:sp>
+        <p:nvSpPr>
+          <p:cNvPr id="5" name="Дата 4"/>
           <p:cNvSpPr>
             <a:spLocks noGrp="1"/>
           </p:cNvSpPr>
@@ -2802,16 +2802,16 @@
           <a:lstStyle/>
           <a:p>
             <a:fld id="{BCC18F51-09EC-435C-A3BA-64A766E099C0}" type="datetimeFigureOut">
-              <a:rPr lang="fr-FR" smtClean="0"/>
+              <a:rPr lang="ru-RU" smtClean="0"/>
               <a:t>30.10.2013</a:t>
             </a:fld>
-            <a:endParaRPr lang="fr-FR"/>
-          </a:p>
-        </p:txBody>
-      </p:sp>
-      <p:sp>
-        <p:nvSpPr>
-          <p:cNvPr id="6" name="Espace réservé du pied de page 5"/>
+            <a:endParaRPr lang="ru-RU"/>
+          </a:p>
+        </p:txBody>
+      </p:sp>
+      <p:sp>
+        <p:nvSpPr>
+          <p:cNvPr id="6" name="Нижний колонтитул 5"/>
           <p:cNvSpPr>
             <a:spLocks noGrp="1"/>
           </p:cNvSpPr>
@@ -2824,13 +2824,13 @@
           <a:bodyPr/>
           <a:lstStyle/>
           <a:p>
-            <a:endParaRPr lang="fr-FR"/>
-          </a:p>
-        </p:txBody>
-      </p:sp>
-      <p:sp>
-        <p:nvSpPr>
-          <p:cNvPr id="7" name="Espace réservé du numéro de diapositive 6"/>
+            <a:endParaRPr lang="ru-RU"/>
+          </a:p>
+        </p:txBody>
+      </p:sp>
+      <p:sp>
+        <p:nvSpPr>
+          <p:cNvPr id="7" name="Номер слайда 6"/>
           <p:cNvSpPr>
             <a:spLocks noGrp="1"/>
           </p:cNvSpPr>
@@ -2844,10 +2844,10 @@
           <a:lstStyle/>
           <a:p>
             <a:fld id="{08395586-F03A-48D1-94DF-16B239DF4FB5}" type="slidenum">
-              <a:rPr lang="fr-FR" smtClean="0"/>
+              <a:rPr lang="ru-RU" smtClean="0"/>
               <a:t>‹#›</a:t>
             </a:fld>
-            <a:endParaRPr lang="fr-FR"/>
+            <a:endParaRPr lang="ru-RU"/>
           </a:p>
         </p:txBody>
       </p:sp>
@@ -2888,7 +2888,7 @@
       </p:grpSpPr>
       <p:sp>
         <p:nvSpPr>
-          <p:cNvPr id="2" name="Espace réservé du titre 1"/>
+          <p:cNvPr id="2" name="Заголовок 1"/>
           <p:cNvSpPr>
             <a:spLocks noGrp="1"/>
           </p:cNvSpPr>
@@ -2912,16 +2912,16 @@
           <a:lstStyle/>
           <a:p>
             <a:r>
-              <a:rPr lang="fr-FR" smtClean="0"/>
-              <a:t>Modifiez le style du titre</a:t>
-            </a:r>
-            <a:endParaRPr lang="fr-FR" dirty="0"/>
-          </a:p>
-        </p:txBody>
-      </p:sp>
-      <p:sp>
-        <p:nvSpPr>
-          <p:cNvPr id="3" name="Espace réservé du texte 2"/>
+              <a:rPr lang="ru-RU" smtClean="0"/>
+              <a:t>Образец заголовка</a:t>
+            </a:r>
+            <a:endParaRPr lang="ru-RU" dirty="0"/>
+          </a:p>
+        </p:txBody>
+      </p:sp>
+      <p:sp>
+        <p:nvSpPr>
+          <p:cNvPr id="3" name="Текст 2"/>
           <p:cNvSpPr>
             <a:spLocks noGrp="1"/>
           </p:cNvSpPr>
@@ -2946,44 +2946,44 @@
           <a:p>
             <a:pPr lvl="0"/>
             <a:r>
-              <a:rPr lang="fr-FR" smtClean="0"/>
-              <a:t>Modifiez les styles du texte du masque</a:t>
+              <a:rPr lang="ru-RU" smtClean="0"/>
+              <a:t>Образец текста</a:t>
             </a:r>
           </a:p>
           <a:p>
             <a:pPr lvl="1"/>
             <a:r>
-              <a:rPr lang="fr-FR" smtClean="0"/>
-              <a:t>Deuxième niveau</a:t>
+              <a:rPr lang="ru-RU" smtClean="0"/>
+              <a:t>Второй уровень</a:t>
             </a:r>
           </a:p>
           <a:p>
             <a:pPr lvl="2"/>
             <a:r>
-              <a:rPr lang="fr-FR" smtClean="0"/>
-              <a:t>Troisième niveau</a:t>
+              <a:rPr lang="ru-RU" smtClean="0"/>
+              <a:t>Третий уровень</a:t>
             </a:r>
           </a:p>
           <a:p>
             <a:pPr lvl="3"/>
             <a:r>
-              <a:rPr lang="fr-FR" smtClean="0"/>
-              <a:t>Quatrième niveau</a:t>
+              <a:rPr lang="ru-RU" smtClean="0"/>
+              <a:t>Четвертый уровень</a:t>
             </a:r>
           </a:p>
           <a:p>
             <a:pPr lvl="4"/>
             <a:r>
-              <a:rPr lang="fr-FR" smtClean="0"/>
-              <a:t>Cinquième niveau</a:t>
-            </a:r>
-            <a:endParaRPr lang="fr-FR" dirty="0"/>
-          </a:p>
-        </p:txBody>
-      </p:sp>
-      <p:sp>
-        <p:nvSpPr>
-          <p:cNvPr id="4" name="Espace réservé de la date 3"/>
+              <a:rPr lang="ru-RU" smtClean="0"/>
+              <a:t>Пятый уровень</a:t>
+            </a:r>
+            <a:endParaRPr lang="ru-RU" dirty="0"/>
+          </a:p>
+        </p:txBody>
+      </p:sp>
+      <p:sp>
+        <p:nvSpPr>
+          <p:cNvPr id="4" name="Дата 3"/>
           <p:cNvSpPr>
             <a:spLocks noGrp="1"/>
           </p:cNvSpPr>
@@ -3015,16 +3015,16 @@
           </a:lstStyle>
           <a:p>
             <a:fld id="{BCC18F51-09EC-435C-A3BA-64A766E099C0}" type="datetimeFigureOut">
-              <a:rPr lang="fr-FR" smtClean="0"/>
+              <a:rPr lang="ru-RU" smtClean="0"/>
               <a:t>30.10.2013</a:t>
             </a:fld>
-            <a:endParaRPr lang="fr-FR"/>
-          </a:p>
-        </p:txBody>
-      </p:sp>
-      <p:sp>
-        <p:nvSpPr>
-          <p:cNvPr id="5" name="Espace réservé du pied de page 4"/>
+            <a:endParaRPr lang="ru-RU"/>
+          </a:p>
+        </p:txBody>
+      </p:sp>
+      <p:sp>
+        <p:nvSpPr>
+          <p:cNvPr id="5" name="Нижний колонтитул 4"/>
           <p:cNvSpPr>
             <a:spLocks noGrp="1"/>
           </p:cNvSpPr>
@@ -3055,13 +3055,13 @@
             </a:lvl1pPr>
           </a:lstStyle>
           <a:p>
-            <a:endParaRPr lang="fr-FR"/>
-          </a:p>
-        </p:txBody>
-      </p:sp>
-      <p:sp>
-        <p:nvSpPr>
-          <p:cNvPr id="6" name="Espace réservé du numéro de diapositive 5"/>
+            <a:endParaRPr lang="ru-RU"/>
+          </a:p>
+        </p:txBody>
+      </p:sp>
+      <p:sp>
+        <p:nvSpPr>
+          <p:cNvPr id="6" name="Номер слайда 5"/>
           <p:cNvSpPr>
             <a:spLocks noGrp="1"/>
           </p:cNvSpPr>
@@ -3093,10 +3093,10 @@
           </a:lstStyle>
           <a:p>
             <a:fld id="{08395586-F03A-48D1-94DF-16B239DF4FB5}" type="slidenum">
-              <a:rPr lang="fr-FR" smtClean="0"/>
+              <a:rPr lang="ru-RU" smtClean="0"/>
               <a:t>‹#›</a:t>
             </a:fld>
-            <a:endParaRPr lang="fr-FR"/>
+            <a:endParaRPr lang="ru-RU"/>
           </a:p>
         </p:txBody>
       </p:sp>
@@ -3307,7 +3307,7 @@
     </p:bodyStyle>
     <p:otherStyle>
       <a:defPPr>
-        <a:defRPr lang="fr-FR"/>
+        <a:defRPr lang="ru-RU"/>
       </a:defPPr>
       <a:lvl1pPr marL="0" algn="l" defTabSz="914400" rtl="0" eaLnBrk="1" latinLnBrk="0" hangingPunct="1">
         <a:defRPr sz="1800" kern="1200">
@@ -3436,7 +3436,7 @@
           <a:bodyPr/>
           <a:lstStyle/>
           <a:p>
-            <a:endParaRPr lang="fr-FR" dirty="0"/>
+            <a:endParaRPr lang="ru-RU" dirty="0"/>
           </a:p>
         </p:txBody>
       </p:sp>
@@ -3455,7 +3455,7 @@
           <a:bodyPr/>
           <a:lstStyle/>
           <a:p>
-            <a:endParaRPr lang="fr-FR" dirty="0"/>
+            <a:endParaRPr lang="ru-RU" dirty="0"/>
           </a:p>
         </p:txBody>
       </p:sp>

</xml_diff>